<commit_message>
ajout page des livrables
</commit_message>
<xml_diff>
--- a/op-projet4.pptx
+++ b/op-projet4.pptx
@@ -5,10 +5,10 @@
     <p:sldMasterId id="2147483648" r:id="rId1"/>
   </p:sldMasterIdLst>
   <p:notesMasterIdLst>
-    <p:notesMasterId r:id="rId29"/>
+    <p:notesMasterId r:id="rId30"/>
   </p:notesMasterIdLst>
   <p:handoutMasterIdLst>
-    <p:handoutMasterId r:id="rId30"/>
+    <p:handoutMasterId r:id="rId31"/>
   </p:handoutMasterIdLst>
   <p:sldIdLst>
     <p:sldId id="256" r:id="rId2"/>
@@ -37,7 +37,8 @@
     <p:sldId id="360" r:id="rId25"/>
     <p:sldId id="365" r:id="rId26"/>
     <p:sldId id="366" r:id="rId27"/>
-    <p:sldId id="330" r:id="rId28"/>
+    <p:sldId id="367" r:id="rId28"/>
+    <p:sldId id="330" r:id="rId29"/>
   </p:sldIdLst>
   <p:sldSz cx="9144000" cy="6858000" type="screen4x3"/>
   <p:notesSz cx="6858000" cy="9144000"/>
@@ -251,7 +252,7 @@
           <a:p>
             <a:fld id="{09A990B0-5BEE-466B-853C-9608DB6BC8FB}" type="datetimeFigureOut">
               <a:rPr lang="en-US" smtClean="0"/>
-              <a:t>9/19/2018</a:t>
+              <a:t>9/20/2018</a:t>
             </a:fld>
             <a:endParaRPr lang="en-US"/>
           </a:p>
@@ -416,7 +417,7 @@
           <a:p>
             <a:fld id="{545B8DFF-3B96-41A0-9B28-6E55A2E48E01}" type="datetimeFigureOut">
               <a:rPr lang="en-US" smtClean="0"/>
-              <a:t>9/19/2018</a:t>
+              <a:t>9/20/2018</a:t>
             </a:fld>
             <a:endParaRPr lang="en-US"/>
           </a:p>
@@ -1235,7 +1236,7 @@
             <a:fld id="{53074F12-AA26-4AC8-9962-C36BB8F32554}" type="datetimeFigureOut">
               <a:rPr lang="en-US" smtClean="0"/>
               <a:pPr/>
-              <a:t>9/19/2018</a:t>
+              <a:t>9/20/2018</a:t>
             </a:fld>
             <a:endParaRPr lang="en-US"/>
           </a:p>
@@ -1537,7 +1538,7 @@
             <a:fld id="{53074F12-AA26-4AC8-9962-C36BB8F32554}" type="datetimeFigureOut">
               <a:rPr lang="en-US" smtClean="0"/>
               <a:pPr/>
-              <a:t>9/19/2018</a:t>
+              <a:t>9/20/2018</a:t>
             </a:fld>
             <a:endParaRPr lang="en-US"/>
           </a:p>
@@ -1777,7 +1778,7 @@
             <a:fld id="{53074F12-AA26-4AC8-9962-C36BB8F32554}" type="datetimeFigureOut">
               <a:rPr lang="en-US" smtClean="0"/>
               <a:pPr/>
-              <a:t>9/19/2018</a:t>
+              <a:t>9/20/2018</a:t>
             </a:fld>
             <a:endParaRPr lang="en-US"/>
           </a:p>
@@ -2027,7 +2028,7 @@
             <a:fld id="{53074F12-AA26-4AC8-9962-C36BB8F32554}" type="datetimeFigureOut">
               <a:rPr lang="en-US" smtClean="0"/>
               <a:pPr/>
-              <a:t>9/19/2018</a:t>
+              <a:t>9/20/2018</a:t>
             </a:fld>
             <a:endParaRPr lang="en-US"/>
           </a:p>
@@ -2279,7 +2280,7 @@
             <a:fld id="{53074F12-AA26-4AC8-9962-C36BB8F32554}" type="datetimeFigureOut">
               <a:rPr lang="en-US" smtClean="0"/>
               <a:pPr/>
-              <a:t>9/19/2018</a:t>
+              <a:t>9/20/2018</a:t>
             </a:fld>
             <a:endParaRPr lang="en-US"/>
           </a:p>
@@ -2400,7 +2401,7 @@
             <a:fld id="{53074F12-AA26-4AC8-9962-C36BB8F32554}" type="datetimeFigureOut">
               <a:rPr lang="en-US" smtClean="0"/>
               <a:pPr/>
-              <a:t>9/19/2018</a:t>
+              <a:t>9/20/2018</a:t>
             </a:fld>
             <a:endParaRPr lang="en-US"/>
           </a:p>
@@ -2821,7 +2822,7 @@
             <a:fld id="{53074F12-AA26-4AC8-9962-C36BB8F32554}" type="datetimeFigureOut">
               <a:rPr lang="en-US" smtClean="0"/>
               <a:pPr/>
-              <a:t>9/19/2018</a:t>
+              <a:t>9/20/2018</a:t>
             </a:fld>
             <a:endParaRPr lang="en-US"/>
           </a:p>
@@ -3183,7 +3184,7 @@
             <a:fld id="{53074F12-AA26-4AC8-9962-C36BB8F32554}" type="datetimeFigureOut">
               <a:rPr lang="en-US" smtClean="0"/>
               <a:pPr/>
-              <a:t>9/19/2018</a:t>
+              <a:t>9/20/2018</a:t>
             </a:fld>
             <a:endParaRPr lang="en-US"/>
           </a:p>
@@ -3690,7 +3691,7 @@
             <a:fld id="{53074F12-AA26-4AC8-9962-C36BB8F32554}" type="datetimeFigureOut">
               <a:rPr lang="en-US" smtClean="0"/>
               <a:pPr/>
-              <a:t>9/19/2018</a:t>
+              <a:t>9/20/2018</a:t>
             </a:fld>
             <a:endParaRPr lang="en-US"/>
           </a:p>
@@ -3842,7 +3843,7 @@
             <a:fld id="{53074F12-AA26-4AC8-9962-C36BB8F32554}" type="datetimeFigureOut">
               <a:rPr lang="en-US" smtClean="0"/>
               <a:pPr/>
-              <a:t>9/19/2018</a:t>
+              <a:t>9/20/2018</a:t>
             </a:fld>
             <a:endParaRPr lang="en-US"/>
           </a:p>
@@ -3963,7 +3964,7 @@
             <a:fld id="{53074F12-AA26-4AC8-9962-C36BB8F32554}" type="datetimeFigureOut">
               <a:rPr lang="en-US" smtClean="0"/>
               <a:pPr/>
-              <a:t>9/19/2018</a:t>
+              <a:t>9/20/2018</a:t>
             </a:fld>
             <a:endParaRPr lang="en-US"/>
           </a:p>
@@ -4294,7 +4295,7 @@
             <a:fld id="{53074F12-AA26-4AC8-9962-C36BB8F32554}" type="datetimeFigureOut">
               <a:rPr lang="en-US" smtClean="0"/>
               <a:pPr/>
-              <a:t>9/19/2018</a:t>
+              <a:t>9/20/2018</a:t>
             </a:fld>
             <a:endParaRPr lang="en-US"/>
           </a:p>
@@ -4532,7 +4533,7 @@
             <a:fld id="{53074F12-AA26-4AC8-9962-C36BB8F32554}" type="datetimeFigureOut">
               <a:rPr lang="en-US" smtClean="0"/>
               <a:pPr/>
-              <a:t>9/19/2018</a:t>
+              <a:t>9/20/2018</a:t>
             </a:fld>
             <a:endParaRPr lang="en-US"/>
           </a:p>
@@ -4936,19 +4937,7 @@
               <a:rPr lang="fr-FR" sz="2000" dirty="0" smtClean="0">
                 <a:ea typeface="+mn-ea"/>
               </a:rPr>
-              <a:t>Projet </a:t>
-            </a:r>
-            <a:r>
-              <a:rPr lang="fr-FR" sz="2000" dirty="0" smtClean="0">
-                <a:ea typeface="+mn-ea"/>
-              </a:rPr>
-              <a:t>4</a:t>
-            </a:r>
-            <a:r>
-              <a:rPr lang="fr-FR" sz="2000" dirty="0" smtClean="0">
-                <a:ea typeface="+mn-ea"/>
-              </a:rPr>
-              <a:t/>
+              <a:t>Projet 4</a:t>
             </a:r>
             <a:br>
               <a:rPr lang="fr-FR" sz="2000" dirty="0" smtClean="0">
@@ -4973,15 +4962,6 @@
               </a:rPr>
               <a:t>nticipez le retard de vol des avions</a:t>
             </a:r>
-            <a:r>
-              <a:rPr lang="fr-FR" sz="2000" dirty="0" smtClean="0">
-                <a:solidFill>
-                  <a:srgbClr val="FFC000"/>
-                </a:solidFill>
-                <a:ea typeface="+mn-ea"/>
-              </a:rPr>
-              <a:t/>
-            </a:r>
             <a:br>
               <a:rPr lang="fr-FR" sz="2000" dirty="0" smtClean="0">
                 <a:solidFill>
@@ -4994,19 +4974,7 @@
               <a:rPr lang="fr-FR" sz="2000" dirty="0" smtClean="0">
                 <a:ea typeface="+mn-ea"/>
               </a:rPr>
-              <a:t>Le </a:t>
-            </a:r>
-            <a:r>
-              <a:rPr lang="fr-FR" sz="2000" dirty="0" smtClean="0">
-                <a:ea typeface="+mn-ea"/>
-              </a:rPr>
-              <a:t>20</a:t>
-            </a:r>
-            <a:r>
-              <a:rPr lang="fr-FR" sz="2000" dirty="0" smtClean="0">
-                <a:ea typeface="+mn-ea"/>
-              </a:rPr>
-              <a:t>/09/2018</a:t>
+              <a:t>Le 20/09/2018</a:t>
             </a:r>
             <a:r>
               <a:rPr lang="en-US" sz="1800" dirty="0" smtClean="0"/>
@@ -5052,11 +5020,7 @@
             </a:r>
             <a:r>
               <a:rPr lang="en-US" sz="1400" b="1" i="1" dirty="0" smtClean="0"/>
-              <a:t> </a:t>
-            </a:r>
-            <a:r>
-              <a:rPr lang="en-US" sz="1400" b="1" i="1" dirty="0" smtClean="0"/>
-              <a:t> 4 - </a:t>
+              <a:t>  4 - </a:t>
             </a:r>
             <a:r>
               <a:rPr lang="en-US" sz="1400" b="1" i="1" dirty="0" err="1" smtClean="0"/>
@@ -5530,7 +5494,6 @@
               <a:rPr lang="en-US" sz="1400" b="1" i="1" dirty="0" smtClean="0"/>
               <a:t> data sciences</a:t>
             </a:r>
-            <a:endParaRPr lang="en-US" sz="1400" b="1" i="1" dirty="0" smtClean="0"/>
           </a:p>
         </p:txBody>
       </p:sp>
@@ -5996,7 +5959,6 @@
               <a:rPr lang="en-US" sz="1400" b="1" i="1" dirty="0" smtClean="0"/>
               <a:t> data sciences</a:t>
             </a:r>
-            <a:endParaRPr lang="en-US" sz="1400" b="1" i="1" dirty="0" smtClean="0"/>
           </a:p>
         </p:txBody>
       </p:sp>
@@ -6158,11 +6120,6 @@
               </a:rPr>
               <a:t>retard &gt; 120 min ou &lt; -20 min</a:t>
             </a:r>
-            <a:endParaRPr lang="fr-FR" sz="2000" dirty="0" smtClean="0">
-              <a:solidFill>
-                <a:srgbClr val="FFC000"/>
-              </a:solidFill>
-            </a:endParaRPr>
           </a:p>
         </p:txBody>
       </p:sp>
@@ -6387,7 +6344,6 @@
               <a:rPr lang="en-US" sz="1400" b="1" i="1" dirty="0" smtClean="0"/>
               <a:t> data sciences</a:t>
             </a:r>
-            <a:endParaRPr lang="en-US" sz="1400" b="1" i="1" dirty="0" smtClean="0"/>
           </a:p>
         </p:txBody>
       </p:sp>
@@ -6759,7 +6715,6 @@
               <a:rPr lang="en-US" sz="1400" b="1" i="1" dirty="0" smtClean="0"/>
               <a:t> data sciences</a:t>
             </a:r>
-            <a:endParaRPr lang="en-US" sz="1400" b="1" i="1" dirty="0" smtClean="0"/>
           </a:p>
         </p:txBody>
       </p:sp>
@@ -7107,7 +7062,6 @@
               <a:rPr lang="en-US" sz="1400" b="1" i="1" dirty="0" smtClean="0"/>
               <a:t> data sciences</a:t>
             </a:r>
-            <a:endParaRPr lang="en-US" sz="1400" b="1" i="1" dirty="0" smtClean="0"/>
           </a:p>
         </p:txBody>
       </p:sp>
@@ -7455,7 +7409,6 @@
               <a:rPr lang="en-US" sz="1400" b="1" i="1" dirty="0" smtClean="0"/>
               <a:t> data sciences</a:t>
             </a:r>
-            <a:endParaRPr lang="en-US" sz="1400" b="1" i="1" dirty="0" smtClean="0"/>
           </a:p>
         </p:txBody>
       </p:sp>
@@ -7803,7 +7756,6 @@
               <a:rPr lang="en-US" sz="1400" b="1" i="1" dirty="0" smtClean="0"/>
               <a:t> data sciences</a:t>
             </a:r>
-            <a:endParaRPr lang="en-US" sz="1400" b="1" i="1" dirty="0" smtClean="0"/>
           </a:p>
         </p:txBody>
       </p:sp>
@@ -8151,7 +8103,6 @@
               <a:rPr lang="en-US" sz="1400" b="1" i="1" dirty="0" smtClean="0"/>
               <a:t> data sciences</a:t>
             </a:r>
-            <a:endParaRPr lang="en-US" sz="1400" b="1" i="1" dirty="0" smtClean="0"/>
           </a:p>
         </p:txBody>
       </p:sp>
@@ -8499,7 +8450,6 @@
               <a:rPr lang="en-US" sz="1400" b="1" i="1" dirty="0" smtClean="0"/>
               <a:t> data sciences</a:t>
             </a:r>
-            <a:endParaRPr lang="en-US" sz="1400" b="1" i="1" dirty="0" smtClean="0"/>
           </a:p>
         </p:txBody>
       </p:sp>
@@ -8831,7 +8781,6 @@
               <a:rPr lang="fr-FR" sz="1800" dirty="0"/>
               <a:t> pour l’api</a:t>
             </a:r>
-            <a:endParaRPr lang="fr-FR" sz="1800" dirty="0"/>
           </a:p>
           <a:p>
             <a:pPr marL="0" indent="0">
@@ -9077,7 +9026,6 @@
               <a:rPr lang="en-US" sz="1400" b="1" i="1" dirty="0" smtClean="0"/>
               <a:t> data sciences</a:t>
             </a:r>
-            <a:endParaRPr lang="en-US" sz="1400" b="1" i="1" dirty="0" smtClean="0"/>
           </a:p>
         </p:txBody>
       </p:sp>
@@ -9309,11 +9257,7 @@
             </a:pPr>
             <a:r>
               <a:rPr lang="fr-FR" sz="2400" dirty="0" smtClean="0"/>
-              <a:t>O</a:t>
-            </a:r>
-            <a:r>
-              <a:rPr lang="fr-FR" sz="2400" dirty="0" smtClean="0"/>
-              <a:t>ptimiser un model de prédiction pour anticiper le retard du vol des avions</a:t>
+              <a:t>Optimiser un model de prédiction pour anticiper le retard du vol des avions</a:t>
             </a:r>
           </a:p>
           <a:p>
@@ -9567,7 +9511,6 @@
               <a:rPr lang="en-US" sz="1400" b="1" i="1" dirty="0" smtClean="0"/>
               <a:t> data sciences</a:t>
             </a:r>
-            <a:endParaRPr lang="en-US" sz="1400" b="1" i="1" dirty="0" smtClean="0"/>
           </a:p>
         </p:txBody>
       </p:sp>
@@ -10172,7 +10115,6 @@
               <a:rPr lang="en-US" sz="1400" b="1" i="1" dirty="0" smtClean="0"/>
               <a:t> data sciences</a:t>
             </a:r>
-            <a:endParaRPr lang="en-US" sz="1400" b="1" i="1" dirty="0" smtClean="0"/>
           </a:p>
         </p:txBody>
       </p:sp>
@@ -10652,7 +10594,6 @@
               <a:rPr lang="en-US" sz="1400" b="1" i="1" dirty="0" smtClean="0"/>
               <a:t> data sciences</a:t>
             </a:r>
-            <a:endParaRPr lang="en-US" sz="1400" b="1" i="1" dirty="0" smtClean="0"/>
           </a:p>
         </p:txBody>
       </p:sp>
@@ -11161,7 +11102,6 @@
               <a:rPr lang="en-US" sz="1400" b="1" i="1" dirty="0" smtClean="0"/>
               <a:t> data sciences</a:t>
             </a:r>
-            <a:endParaRPr lang="en-US" sz="1400" b="1" i="1" dirty="0" smtClean="0"/>
           </a:p>
         </p:txBody>
       </p:sp>
@@ -11682,7 +11622,6 @@
               <a:rPr lang="en-US" sz="1400" b="1" i="1" dirty="0" smtClean="0"/>
               <a:t> data sciences</a:t>
             </a:r>
-            <a:endParaRPr lang="en-US" sz="1400" b="1" i="1" dirty="0" smtClean="0"/>
           </a:p>
         </p:txBody>
       </p:sp>
@@ -12168,7 +12107,6 @@
               <a:rPr lang="en-US" sz="1400" b="1" i="1" dirty="0" smtClean="0"/>
               <a:t> data sciences</a:t>
             </a:r>
-            <a:endParaRPr lang="en-US" sz="1400" b="1" i="1" dirty="0" smtClean="0"/>
           </a:p>
         </p:txBody>
       </p:sp>
@@ -12504,11 +12442,6 @@
               </a:rPr>
               <a:t>MAE : 10.95 minutes</a:t>
             </a:r>
-            <a:endParaRPr lang="fr-FR" sz="2400" dirty="0" smtClean="0">
-              <a:solidFill>
-                <a:srgbClr val="FFC000"/>
-              </a:solidFill>
-            </a:endParaRPr>
           </a:p>
         </p:txBody>
       </p:sp>
@@ -12742,7 +12675,6 @@
               <a:rPr lang="en-US" sz="1400" b="1" i="1" dirty="0" smtClean="0"/>
               <a:t> data sciences</a:t>
             </a:r>
-            <a:endParaRPr lang="en-US" sz="1400" b="1" i="1" dirty="0" smtClean="0"/>
           </a:p>
         </p:txBody>
       </p:sp>
@@ -13238,7 +13170,6 @@
               <a:rPr lang="en-US" sz="1400" b="1" i="1" dirty="0" smtClean="0"/>
               <a:t> data sciences</a:t>
             </a:r>
-            <a:endParaRPr lang="en-US" sz="1400" b="1" i="1" dirty="0" smtClean="0"/>
           </a:p>
         </p:txBody>
       </p:sp>
@@ -13287,6 +13218,664 @@
 </file>
 
 <file path=ppt/slides/slide27.xml><?xml version="1.0" encoding="utf-8"?>
+<p:sld xmlns:a="http://schemas.openxmlformats.org/drawingml/2006/main" xmlns:r="http://schemas.openxmlformats.org/officeDocument/2006/relationships" xmlns:p="http://schemas.openxmlformats.org/presentationml/2006/main">
+  <p:cSld>
+    <p:spTree>
+      <p:nvGrpSpPr>
+        <p:cNvPr id="1" name=""/>
+        <p:cNvGrpSpPr/>
+        <p:nvPr/>
+      </p:nvGrpSpPr>
+      <p:grpSpPr>
+        <a:xfrm>
+          <a:off x="0" y="0"/>
+          <a:ext cx="0" cy="0"/>
+          <a:chOff x="0" y="0"/>
+          <a:chExt cx="0" cy="0"/>
+        </a:xfrm>
+      </p:grpSpPr>
+      <p:pic>
+        <p:nvPicPr>
+          <p:cNvPr id="15" name="Image 14"/>
+          <p:cNvPicPr>
+            <a:picLocks noChangeAspect="1"/>
+          </p:cNvPicPr>
+          <p:nvPr/>
+        </p:nvPicPr>
+        <p:blipFill>
+          <a:blip r:embed="rId2" cstate="print">
+            <a:extLst>
+              <a:ext uri="{28A0092B-C50C-407E-A947-70E740481C1C}">
+                <a14:useLocalDpi xmlns:a14="http://schemas.microsoft.com/office/drawing/2010/main" val="0"/>
+              </a:ext>
+            </a:extLst>
+          </a:blip>
+          <a:stretch>
+            <a:fillRect/>
+          </a:stretch>
+        </p:blipFill>
+        <p:spPr>
+          <a:xfrm>
+            <a:off x="12441" y="0"/>
+            <a:ext cx="1143000" cy="548173"/>
+          </a:xfrm>
+          <a:prstGeom prst="rect">
+            <a:avLst/>
+          </a:prstGeom>
+        </p:spPr>
+      </p:pic>
+      <p:sp>
+        <p:nvSpPr>
+          <p:cNvPr id="4" name="Rectangle 3"/>
+          <p:cNvSpPr/>
+          <p:nvPr/>
+        </p:nvSpPr>
+        <p:spPr>
+          <a:xfrm>
+            <a:off x="2695446" y="1371600"/>
+            <a:ext cx="5686553" cy="4247317"/>
+          </a:xfrm>
+          <a:prstGeom prst="rect">
+            <a:avLst/>
+          </a:prstGeom>
+        </p:spPr>
+        <p:txBody>
+          <a:bodyPr wrap="square">
+            <a:spAutoFit/>
+          </a:bodyPr>
+          <a:lstStyle/>
+          <a:p>
+            <a:r>
+              <a:rPr lang="fr-FR" dirty="0">
+                <a:latin typeface="Source Sans Pro"/>
+              </a:rPr>
+              <a:t> </a:t>
+            </a:r>
+          </a:p>
+          <a:p>
+            <a:endParaRPr lang="fr-FR" dirty="0" smtClean="0">
+              <a:latin typeface="Source Sans Pro"/>
+            </a:endParaRPr>
+          </a:p>
+          <a:p>
+            <a:endParaRPr lang="fr-FR" dirty="0">
+              <a:latin typeface="Source Sans Pro"/>
+            </a:endParaRPr>
+          </a:p>
+          <a:p>
+            <a:endParaRPr lang="fr-FR" dirty="0" smtClean="0">
+              <a:latin typeface="Source Sans Pro"/>
+            </a:endParaRPr>
+          </a:p>
+          <a:p>
+            <a:endParaRPr lang="fr-FR" dirty="0">
+              <a:latin typeface="Source Sans Pro"/>
+            </a:endParaRPr>
+          </a:p>
+          <a:p>
+            <a:endParaRPr lang="fr-FR" dirty="0" smtClean="0">
+              <a:latin typeface="Source Sans Pro"/>
+            </a:endParaRPr>
+          </a:p>
+          <a:p>
+            <a:endParaRPr lang="fr-FR" dirty="0">
+              <a:latin typeface="Source Sans Pro"/>
+            </a:endParaRPr>
+          </a:p>
+          <a:p>
+            <a:endParaRPr lang="fr-FR" dirty="0" smtClean="0">
+              <a:latin typeface="Source Sans Pro"/>
+            </a:endParaRPr>
+          </a:p>
+          <a:p>
+            <a:endParaRPr lang="fr-FR" dirty="0">
+              <a:latin typeface="Source Sans Pro"/>
+            </a:endParaRPr>
+          </a:p>
+          <a:p>
+            <a:endParaRPr lang="fr-FR" dirty="0" smtClean="0">
+              <a:latin typeface="Source Sans Pro"/>
+            </a:endParaRPr>
+          </a:p>
+          <a:p>
+            <a:endParaRPr lang="fr-FR" dirty="0">
+              <a:latin typeface="Source Sans Pro"/>
+            </a:endParaRPr>
+          </a:p>
+          <a:p>
+            <a:endParaRPr lang="fr-FR" dirty="0" smtClean="0">
+              <a:latin typeface="Source Sans Pro"/>
+            </a:endParaRPr>
+          </a:p>
+          <a:p>
+            <a:endParaRPr lang="fr-FR" dirty="0">
+              <a:latin typeface="Source Sans Pro"/>
+            </a:endParaRPr>
+          </a:p>
+          <a:p>
+            <a:endParaRPr lang="fr-FR" dirty="0" smtClean="0">
+              <a:latin typeface="Source Sans Pro"/>
+            </a:endParaRPr>
+          </a:p>
+          <a:p>
+            <a:endParaRPr lang="fr-FR" dirty="0"/>
+          </a:p>
+        </p:txBody>
+      </p:sp>
+      <p:sp>
+        <p:nvSpPr>
+          <p:cNvPr id="18" name="Content Placeholder 4"/>
+          <p:cNvSpPr>
+            <a:spLocks noGrp="1"/>
+          </p:cNvSpPr>
+          <p:nvPr>
+            <p:ph idx="1"/>
+          </p:nvPr>
+        </p:nvSpPr>
+        <p:spPr>
+          <a:xfrm>
+            <a:off x="1371600" y="1443835"/>
+            <a:ext cx="7306964" cy="4956965"/>
+          </a:xfrm>
+        </p:spPr>
+        <p:txBody>
+          <a:bodyPr>
+            <a:normAutofit fontScale="92500" lnSpcReduction="10000"/>
+          </a:bodyPr>
+          <a:lstStyle/>
+          <a:p>
+            <a:pPr marL="0" indent="0">
+              <a:buNone/>
+            </a:pPr>
+            <a:r>
+              <a:rPr lang="fr-FR" sz="2400" dirty="0" smtClean="0"/>
+              <a:t>Sur </a:t>
+            </a:r>
+            <a:r>
+              <a:rPr lang="fr-FR" sz="2400" dirty="0" smtClean="0">
+                <a:hlinkClick r:id="rId3"/>
+              </a:rPr>
+              <a:t>https://github.com/sofianenaar/op.datasciences.project4</a:t>
+            </a:r>
+            <a:endParaRPr lang="fr-FR" sz="2400" dirty="0" smtClean="0"/>
+          </a:p>
+          <a:p>
+            <a:pPr marL="0" indent="0">
+              <a:buNone/>
+            </a:pPr>
+            <a:endParaRPr lang="fr-FR" sz="2400" dirty="0" smtClean="0">
+              <a:solidFill>
+                <a:srgbClr val="FFC000"/>
+              </a:solidFill>
+            </a:endParaRPr>
+          </a:p>
+          <a:p>
+            <a:pPr marL="0" indent="0">
+              <a:buNone/>
+            </a:pPr>
+            <a:r>
+              <a:rPr lang="fr-FR" sz="2400" dirty="0" smtClean="0">
+                <a:solidFill>
+                  <a:srgbClr val="FFC000"/>
+                </a:solidFill>
+              </a:rPr>
+              <a:t>op_proj4.ipynb</a:t>
+            </a:r>
+            <a:r>
+              <a:rPr lang="fr-FR" sz="2400" dirty="0" smtClean="0"/>
+              <a:t> </a:t>
+            </a:r>
+            <a:r>
+              <a:rPr lang="fr-FR" sz="2400" dirty="0"/>
+              <a:t>: notebook de </a:t>
+            </a:r>
+            <a:endParaRPr lang="fr-FR" sz="2400" dirty="0" smtClean="0"/>
+          </a:p>
+          <a:p>
+            <a:pPr lvl="1">
+              <a:buFont typeface="Wingdings" panose="05000000000000000000" pitchFamily="2" charset="2"/>
+              <a:buChar char="ü"/>
+            </a:pPr>
+            <a:r>
+              <a:rPr lang="fr-FR" sz="2000" dirty="0"/>
+              <a:t>D</a:t>
+            </a:r>
+            <a:r>
+              <a:rPr lang="fr-FR" sz="2000" dirty="0" smtClean="0"/>
+              <a:t>ata </a:t>
+            </a:r>
+            <a:r>
+              <a:rPr lang="fr-FR" sz="2000" dirty="0" err="1"/>
+              <a:t>cleaning</a:t>
+            </a:r>
+            <a:r>
+              <a:rPr lang="fr-FR" sz="2000" dirty="0"/>
+              <a:t> </a:t>
+            </a:r>
+            <a:r>
+              <a:rPr lang="fr-FR" sz="2000" dirty="0" smtClean="0"/>
+              <a:t> 			     </a:t>
+            </a:r>
+          </a:p>
+          <a:p>
+            <a:pPr lvl="1">
+              <a:buFont typeface="Wingdings" panose="05000000000000000000" pitchFamily="2" charset="2"/>
+              <a:buChar char="ü"/>
+            </a:pPr>
+            <a:r>
+              <a:rPr lang="fr-FR" sz="2000" dirty="0"/>
+              <a:t>E</a:t>
+            </a:r>
+            <a:r>
+              <a:rPr lang="fr-FR" sz="2000" dirty="0" smtClean="0"/>
+              <a:t>xploration </a:t>
+            </a:r>
+            <a:endParaRPr lang="fr-FR" sz="2000" dirty="0" smtClean="0">
+              <a:solidFill>
+                <a:srgbClr val="FFC000"/>
+              </a:solidFill>
+            </a:endParaRPr>
+          </a:p>
+          <a:p>
+            <a:pPr lvl="1">
+              <a:buFont typeface="Wingdings" panose="05000000000000000000" pitchFamily="2" charset="2"/>
+              <a:buChar char="ü"/>
+            </a:pPr>
+            <a:r>
+              <a:rPr lang="fr-FR" sz="2000" dirty="0"/>
+              <a:t>O</a:t>
+            </a:r>
+            <a:r>
+              <a:rPr lang="fr-FR" sz="2000" dirty="0" smtClean="0"/>
+              <a:t>ptimisation du modèle </a:t>
+            </a:r>
+            <a:r>
+              <a:rPr lang="fr-FR" sz="2000" dirty="0"/>
+              <a:t>de </a:t>
+            </a:r>
+            <a:r>
+              <a:rPr lang="fr-FR" sz="2000" dirty="0" smtClean="0"/>
+              <a:t>prédiction</a:t>
+            </a:r>
+          </a:p>
+          <a:p>
+            <a:pPr marL="457200" lvl="1" indent="0">
+              <a:buNone/>
+            </a:pPr>
+            <a:endParaRPr lang="fr-FR" sz="2000" dirty="0"/>
+          </a:p>
+          <a:p>
+            <a:pPr marL="0" indent="0">
+              <a:buNone/>
+            </a:pPr>
+            <a:r>
+              <a:rPr lang="fr-FR" sz="2400" dirty="0">
+                <a:solidFill>
+                  <a:srgbClr val="FFC000"/>
+                </a:solidFill>
+              </a:rPr>
+              <a:t>op_projet4.pptx</a:t>
+            </a:r>
+            <a:r>
+              <a:rPr lang="fr-FR" sz="2400" dirty="0"/>
+              <a:t> : support de </a:t>
+            </a:r>
+            <a:r>
+              <a:rPr lang="fr-FR" sz="2400" dirty="0" smtClean="0"/>
+              <a:t>présentation</a:t>
+            </a:r>
+          </a:p>
+          <a:p>
+            <a:pPr marL="0" indent="0">
+              <a:buNone/>
+            </a:pPr>
+            <a:endParaRPr lang="fr-FR" sz="2400" dirty="0"/>
+          </a:p>
+          <a:p>
+            <a:pPr marL="0" indent="0">
+              <a:buNone/>
+            </a:pPr>
+            <a:r>
+              <a:rPr lang="fr-FR" sz="2400" dirty="0">
+                <a:solidFill>
+                  <a:srgbClr val="FFC000"/>
+                </a:solidFill>
+              </a:rPr>
+              <a:t>op-proj4.zip</a:t>
+            </a:r>
+            <a:r>
+              <a:rPr lang="fr-FR" sz="2400" dirty="0"/>
+              <a:t>: le projet de l'api python/</a:t>
+            </a:r>
+            <a:r>
+              <a:rPr lang="fr-FR" sz="2400" dirty="0" err="1"/>
+              <a:t>flask</a:t>
+            </a:r>
+            <a:r>
+              <a:rPr lang="fr-FR" sz="2400" dirty="0"/>
+              <a:t> </a:t>
+            </a:r>
+            <a:r>
+              <a:rPr lang="fr-FR" sz="2400" dirty="0" smtClean="0"/>
+              <a:t>déployé </a:t>
+            </a:r>
+            <a:r>
+              <a:rPr lang="fr-FR" sz="2400" dirty="0"/>
+              <a:t>en ligne sur </a:t>
+            </a:r>
+            <a:r>
+              <a:rPr lang="fr-FR" sz="2400" dirty="0" smtClean="0"/>
+              <a:t>:</a:t>
+            </a:r>
+          </a:p>
+          <a:p>
+            <a:pPr marL="0" indent="0">
+              <a:buNone/>
+            </a:pPr>
+            <a:endParaRPr lang="fr-FR" sz="2400" dirty="0"/>
+          </a:p>
+          <a:p>
+            <a:pPr marL="0" indent="0">
+              <a:buNone/>
+            </a:pPr>
+            <a:r>
+              <a:rPr lang="fr-FR" sz="2400" dirty="0" smtClean="0">
+                <a:hlinkClick r:id="rId4"/>
+              </a:rPr>
+              <a:t>https</a:t>
+            </a:r>
+            <a:r>
+              <a:rPr lang="fr-FR" sz="2400" dirty="0">
+                <a:hlinkClick r:id="rId4"/>
+              </a:rPr>
+              <a:t>://</a:t>
+            </a:r>
+            <a:r>
+              <a:rPr lang="fr-FR" sz="2400" dirty="0" smtClean="0">
+                <a:hlinkClick r:id="rId4"/>
+              </a:rPr>
+              <a:t>op-proj4.herokuapp.com/flight-delays-prediction</a:t>
+            </a:r>
+            <a:endParaRPr lang="fr-FR" sz="2400" dirty="0" smtClean="0"/>
+          </a:p>
+          <a:p>
+            <a:pPr marL="0" indent="0">
+              <a:buNone/>
+            </a:pPr>
+            <a:endParaRPr lang="fr-FR" sz="2400" dirty="0" smtClean="0"/>
+          </a:p>
+        </p:txBody>
+      </p:sp>
+      <p:sp>
+        <p:nvSpPr>
+          <p:cNvPr id="20" name="Title 1"/>
+          <p:cNvSpPr>
+            <a:spLocks noGrp="1"/>
+          </p:cNvSpPr>
+          <p:nvPr>
+            <p:ph type="title"/>
+          </p:nvPr>
+        </p:nvSpPr>
+        <p:spPr>
+          <a:xfrm>
+            <a:off x="1371600" y="670188"/>
+            <a:ext cx="6133127" cy="701412"/>
+          </a:xfrm>
+        </p:spPr>
+        <p:txBody>
+          <a:bodyPr>
+            <a:normAutofit fontScale="90000"/>
+          </a:bodyPr>
+          <a:lstStyle/>
+          <a:p>
+            <a:r>
+              <a:rPr lang="en-US" dirty="0" smtClean="0">
+                <a:solidFill>
+                  <a:srgbClr val="FFC000"/>
+                </a:solidFill>
+              </a:rPr>
+              <a:t/>
+            </a:r>
+            <a:br>
+              <a:rPr lang="en-US" dirty="0" smtClean="0">
+                <a:solidFill>
+                  <a:srgbClr val="FFC000"/>
+                </a:solidFill>
+              </a:rPr>
+            </a:br>
+            <a:r>
+              <a:rPr lang="en-US" dirty="0" err="1" smtClean="0">
+                <a:solidFill>
+                  <a:srgbClr val="FFC000"/>
+                </a:solidFill>
+              </a:rPr>
+              <a:t>Livrables</a:t>
+            </a:r>
+            <a:r>
+              <a:rPr lang="en-US" dirty="0" smtClean="0">
+                <a:solidFill>
+                  <a:srgbClr val="FFC000"/>
+                </a:solidFill>
+              </a:rPr>
+              <a:t/>
+            </a:r>
+            <a:br>
+              <a:rPr lang="en-US" dirty="0" smtClean="0">
+                <a:solidFill>
+                  <a:srgbClr val="FFC000"/>
+                </a:solidFill>
+              </a:rPr>
+            </a:br>
+            <a:endParaRPr lang="en-US" dirty="0">
+              <a:solidFill>
+                <a:srgbClr val="FFC000"/>
+              </a:solidFill>
+            </a:endParaRPr>
+          </a:p>
+        </p:txBody>
+      </p:sp>
+      <p:sp>
+        <p:nvSpPr>
+          <p:cNvPr id="9" name="Subtitle 2"/>
+          <p:cNvSpPr txBox="1">
+            <a:spLocks/>
+          </p:cNvSpPr>
+          <p:nvPr/>
+        </p:nvSpPr>
+        <p:spPr>
+          <a:xfrm>
+            <a:off x="6096000" y="23327"/>
+            <a:ext cx="3048000" cy="281473"/>
+          </a:xfrm>
+          <a:prstGeom prst="rect">
+            <a:avLst/>
+          </a:prstGeom>
+        </p:spPr>
+        <p:txBody>
+          <a:bodyPr vert="horz" lIns="91440" tIns="45720" rIns="91440" bIns="45720" rtlCol="0">
+            <a:normAutofit fontScale="92500" lnSpcReduction="10000"/>
+          </a:bodyPr>
+          <a:lstStyle>
+            <a:lvl1pPr marL="342900" indent="-342900" algn="l" defTabSz="914400" rtl="0" eaLnBrk="1" latinLnBrk="0" hangingPunct="1">
+              <a:spcBef>
+                <a:spcPct val="20000"/>
+              </a:spcBef>
+              <a:buFont typeface="Arial" pitchFamily="34" charset="0"/>
+              <a:buChar char="•"/>
+              <a:defRPr sz="2800" kern="1200">
+                <a:solidFill>
+                  <a:schemeClr val="bg1"/>
+                </a:solidFill>
+                <a:latin typeface="Microsoft New Tai Lue" pitchFamily="34" charset="0"/>
+                <a:ea typeface="+mn-ea"/>
+                <a:cs typeface="Microsoft New Tai Lue" pitchFamily="34" charset="0"/>
+              </a:defRPr>
+            </a:lvl1pPr>
+            <a:lvl2pPr marL="742950" indent="-285750" algn="l" defTabSz="914400" rtl="0" eaLnBrk="1" latinLnBrk="0" hangingPunct="1">
+              <a:spcBef>
+                <a:spcPct val="20000"/>
+              </a:spcBef>
+              <a:buFont typeface="Arial" pitchFamily="34" charset="0"/>
+              <a:buChar char="–"/>
+              <a:defRPr sz="2400" kern="1200">
+                <a:solidFill>
+                  <a:schemeClr val="bg1"/>
+                </a:solidFill>
+                <a:latin typeface="Microsoft New Tai Lue" pitchFamily="34" charset="0"/>
+                <a:ea typeface="+mn-ea"/>
+                <a:cs typeface="Microsoft New Tai Lue" pitchFamily="34" charset="0"/>
+              </a:defRPr>
+            </a:lvl2pPr>
+            <a:lvl3pPr marL="1143000" indent="-228600" algn="l" defTabSz="914400" rtl="0" eaLnBrk="1" latinLnBrk="0" hangingPunct="1">
+              <a:spcBef>
+                <a:spcPct val="20000"/>
+              </a:spcBef>
+              <a:buFont typeface="Arial" pitchFamily="34" charset="0"/>
+              <a:buChar char="•"/>
+              <a:defRPr sz="2000" kern="1200">
+                <a:solidFill>
+                  <a:schemeClr val="bg1"/>
+                </a:solidFill>
+                <a:latin typeface="Microsoft New Tai Lue" pitchFamily="34" charset="0"/>
+                <a:ea typeface="+mn-ea"/>
+                <a:cs typeface="Microsoft New Tai Lue" pitchFamily="34" charset="0"/>
+              </a:defRPr>
+            </a:lvl3pPr>
+            <a:lvl4pPr marL="1600200" indent="-228600" algn="l" defTabSz="914400" rtl="0" eaLnBrk="1" latinLnBrk="0" hangingPunct="1">
+              <a:spcBef>
+                <a:spcPct val="20000"/>
+              </a:spcBef>
+              <a:buFont typeface="Arial" pitchFamily="34" charset="0"/>
+              <a:buChar char="–"/>
+              <a:defRPr sz="1800" kern="1200">
+                <a:solidFill>
+                  <a:schemeClr val="bg1"/>
+                </a:solidFill>
+                <a:latin typeface="Microsoft New Tai Lue" pitchFamily="34" charset="0"/>
+                <a:ea typeface="+mn-ea"/>
+                <a:cs typeface="Microsoft New Tai Lue" pitchFamily="34" charset="0"/>
+              </a:defRPr>
+            </a:lvl4pPr>
+            <a:lvl5pPr marL="2057400" indent="-228600" algn="l" defTabSz="914400" rtl="0" eaLnBrk="1" latinLnBrk="0" hangingPunct="1">
+              <a:spcBef>
+                <a:spcPct val="20000"/>
+              </a:spcBef>
+              <a:buFont typeface="Arial" pitchFamily="34" charset="0"/>
+              <a:buChar char="»"/>
+              <a:defRPr sz="1800" kern="1200">
+                <a:solidFill>
+                  <a:schemeClr val="bg1"/>
+                </a:solidFill>
+                <a:latin typeface="Microsoft New Tai Lue" pitchFamily="34" charset="0"/>
+                <a:ea typeface="+mn-ea"/>
+                <a:cs typeface="Microsoft New Tai Lue" pitchFamily="34" charset="0"/>
+              </a:defRPr>
+            </a:lvl5pPr>
+            <a:lvl6pPr marL="2514600" indent="-228600" algn="l" defTabSz="914400" rtl="0" eaLnBrk="1" latinLnBrk="0" hangingPunct="1">
+              <a:spcBef>
+                <a:spcPct val="20000"/>
+              </a:spcBef>
+              <a:buFont typeface="Arial" pitchFamily="34" charset="0"/>
+              <a:buChar char="•"/>
+              <a:defRPr sz="2000" kern="1200">
+                <a:solidFill>
+                  <a:schemeClr val="tx1"/>
+                </a:solidFill>
+                <a:latin typeface="+mn-lt"/>
+                <a:ea typeface="+mn-ea"/>
+                <a:cs typeface="+mn-cs"/>
+              </a:defRPr>
+            </a:lvl6pPr>
+            <a:lvl7pPr marL="2971800" indent="-228600" algn="l" defTabSz="914400" rtl="0" eaLnBrk="1" latinLnBrk="0" hangingPunct="1">
+              <a:spcBef>
+                <a:spcPct val="20000"/>
+              </a:spcBef>
+              <a:buFont typeface="Arial" pitchFamily="34" charset="0"/>
+              <a:buChar char="•"/>
+              <a:defRPr sz="2000" kern="1200">
+                <a:solidFill>
+                  <a:schemeClr val="tx1"/>
+                </a:solidFill>
+                <a:latin typeface="+mn-lt"/>
+                <a:ea typeface="+mn-ea"/>
+                <a:cs typeface="+mn-cs"/>
+              </a:defRPr>
+            </a:lvl7pPr>
+            <a:lvl8pPr marL="3429000" indent="-228600" algn="l" defTabSz="914400" rtl="0" eaLnBrk="1" latinLnBrk="0" hangingPunct="1">
+              <a:spcBef>
+                <a:spcPct val="20000"/>
+              </a:spcBef>
+              <a:buFont typeface="Arial" pitchFamily="34" charset="0"/>
+              <a:buChar char="•"/>
+              <a:defRPr sz="2000" kern="1200">
+                <a:solidFill>
+                  <a:schemeClr val="tx1"/>
+                </a:solidFill>
+                <a:latin typeface="+mn-lt"/>
+                <a:ea typeface="+mn-ea"/>
+                <a:cs typeface="+mn-cs"/>
+              </a:defRPr>
+            </a:lvl8pPr>
+            <a:lvl9pPr marL="3886200" indent="-228600" algn="l" defTabSz="914400" rtl="0" eaLnBrk="1" latinLnBrk="0" hangingPunct="1">
+              <a:spcBef>
+                <a:spcPct val="20000"/>
+              </a:spcBef>
+              <a:buFont typeface="Arial" pitchFamily="34" charset="0"/>
+              <a:buChar char="•"/>
+              <a:defRPr sz="2000" kern="1200">
+                <a:solidFill>
+                  <a:schemeClr val="tx1"/>
+                </a:solidFill>
+                <a:latin typeface="+mn-lt"/>
+                <a:ea typeface="+mn-ea"/>
+                <a:cs typeface="+mn-cs"/>
+              </a:defRPr>
+            </a:lvl9pPr>
+          </a:lstStyle>
+          <a:p>
+            <a:pPr marL="0" indent="0" algn="r">
+              <a:buNone/>
+            </a:pPr>
+            <a:r>
+              <a:rPr lang="en-US" sz="1400" b="1" i="1" dirty="0" err="1" smtClean="0"/>
+              <a:t>Projet</a:t>
+            </a:r>
+            <a:r>
+              <a:rPr lang="en-US" sz="1400" b="1" i="1" dirty="0" smtClean="0"/>
+              <a:t>  4 - </a:t>
+            </a:r>
+            <a:r>
+              <a:rPr lang="en-US" sz="1400" b="1" i="1" dirty="0" err="1" smtClean="0"/>
+              <a:t>Parcours</a:t>
+            </a:r>
+            <a:r>
+              <a:rPr lang="en-US" sz="1400" b="1" i="1" dirty="0" smtClean="0"/>
+              <a:t> data sciences</a:t>
+            </a:r>
+          </a:p>
+        </p:txBody>
+      </p:sp>
+    </p:spTree>
+    <p:extLst>
+      <p:ext uri="{BB962C8B-B14F-4D97-AF65-F5344CB8AC3E}">
+        <p14:creationId xmlns:p14="http://schemas.microsoft.com/office/powerpoint/2010/main" val="206130948"/>
+      </p:ext>
+    </p:extLst>
+  </p:cSld>
+  <p:clrMapOvr>
+    <a:masterClrMapping/>
+  </p:clrMapOvr>
+  <p:timing>
+    <p:tnLst>
+      <p:par>
+        <p:cTn id="1" dur="indefinite" restart="never" nodeType="tmRoot"/>
+      </p:par>
+    </p:tnLst>
+  </p:timing>
+</p:sld>
+</file>
+
+<file path=ppt/slides/slide28.xml><?xml version="1.0" encoding="utf-8"?>
 <p:sld xmlns:a="http://schemas.openxmlformats.org/drawingml/2006/main" xmlns:r="http://schemas.openxmlformats.org/officeDocument/2006/relationships" xmlns:p="http://schemas.openxmlformats.org/presentationml/2006/main">
   <p:cSld>
     <p:spTree>
@@ -13759,7 +14348,6 @@
               <a:rPr lang="en-US" sz="1400" b="1" i="1" dirty="0" smtClean="0"/>
               <a:t> data sciences</a:t>
             </a:r>
-            <a:endParaRPr lang="en-US" sz="1400" b="1" i="1" dirty="0" smtClean="0"/>
           </a:p>
         </p:txBody>
       </p:sp>
@@ -14191,7 +14779,6 @@
               <a:rPr lang="en-US" sz="1400" b="1" i="1" dirty="0" smtClean="0"/>
               <a:t> data sciences</a:t>
             </a:r>
-            <a:endParaRPr lang="en-US" sz="1400" b="1" i="1" dirty="0" smtClean="0"/>
           </a:p>
         </p:txBody>
       </p:sp>
@@ -14307,21 +14894,8 @@
                   <a:srgbClr val="EE8E00"/>
                 </a:solidFill>
               </a:rPr>
-              <a:t>Peu de </a:t>
-            </a:r>
-            <a:r>
-              <a:rPr lang="fr-FR" sz="2000" dirty="0" smtClean="0">
-                <a:solidFill>
-                  <a:srgbClr val="EE8E00"/>
-                </a:solidFill>
-              </a:rPr>
-              <a:t>valeurs manquante dans les 55 variables restantes mais on y revient après le choix de la cible …</a:t>
-            </a:r>
-            <a:endParaRPr lang="fr-FR" sz="2000" dirty="0" smtClean="0">
-              <a:solidFill>
-                <a:srgbClr val="EE8E00"/>
-              </a:solidFill>
-            </a:endParaRPr>
+              <a:t>Peu de valeurs manquante dans les 55 variables restantes mais on y revient après le choix de la cible …</a:t>
+            </a:r>
           </a:p>
         </p:txBody>
       </p:sp>
@@ -14666,23 +15240,7 @@
                   <a:srgbClr val="FFC000"/>
                 </a:solidFill>
               </a:rPr>
-              <a:t>Security Delay, </a:t>
-            </a:r>
-            <a:r>
-              <a:rPr lang="en-US" sz="1400" i="1" dirty="0">
-                <a:solidFill>
-                  <a:srgbClr val="FFC000"/>
-                </a:solidFill>
-              </a:rPr>
-              <a:t>Weather </a:t>
-            </a:r>
-            <a:r>
-              <a:rPr lang="en-US" sz="1400" i="1" dirty="0">
-                <a:solidFill>
-                  <a:srgbClr val="FFC000"/>
-                </a:solidFill>
-              </a:rPr>
-              <a:t>Delay </a:t>
+              <a:t>Security Delay, Weather Delay </a:t>
             </a:r>
             <a:r>
               <a:rPr lang="en-US" sz="1800" dirty="0" smtClean="0"/>
@@ -14948,7 +15506,6 @@
               <a:rPr lang="en-US" sz="1400" b="1" i="1" dirty="0" smtClean="0"/>
               <a:t> data sciences</a:t>
             </a:r>
-            <a:endParaRPr lang="en-US" sz="1400" b="1" i="1" dirty="0" smtClean="0"/>
           </a:p>
         </p:txBody>
       </p:sp>
@@ -15462,7 +16019,6 @@
               <a:rPr lang="en-US" sz="1400" b="1" i="1" dirty="0" smtClean="0"/>
               <a:t> data sciences</a:t>
             </a:r>
-            <a:endParaRPr lang="en-US" sz="1400" b="1" i="1" dirty="0" smtClean="0"/>
           </a:p>
         </p:txBody>
       </p:sp>
@@ -16082,7 +16638,6 @@
               <a:rPr lang="en-US" sz="1400" b="1" i="1" dirty="0" smtClean="0"/>
               <a:t> data sciences</a:t>
             </a:r>
-            <a:endParaRPr lang="en-US" sz="1400" b="1" i="1" dirty="0" smtClean="0"/>
           </a:p>
         </p:txBody>
       </p:sp>
@@ -16757,7 +17312,6 @@
               <a:rPr lang="en-US" sz="1400" b="1" i="1" dirty="0" smtClean="0"/>
               <a:t> data sciences</a:t>
             </a:r>
-            <a:endParaRPr lang="en-US" sz="1400" b="1" i="1" dirty="0" smtClean="0"/>
           </a:p>
         </p:txBody>
       </p:sp>
@@ -17255,7 +17809,6 @@
               <a:rPr lang="en-US" sz="1400" b="1" i="1" dirty="0" smtClean="0"/>
               <a:t> data sciences</a:t>
             </a:r>
-            <a:endParaRPr lang="en-US" sz="1400" b="1" i="1" dirty="0" smtClean="0"/>
           </a:p>
         </p:txBody>
       </p:sp>

</xml_diff>